<commit_message>
Worked on file i/o ppt
</commit_message>
<xml_diff>
--- a/lessons/instrument_control/lesson7/file_io.pptx
+++ b/lessons/instrument_control/lesson7/file_io.pptx
@@ -350,7 +350,7 @@
           <a:p>
             <a:fld id="{A6DF41ED-D6F1-4A66-8517-B46E4FBD4F30}" type="datetimeFigureOut">
               <a:rPr lang="en-US" smtClean="0"/>
-              <a:t>7/26/2024</a:t>
+              <a:t>7/28/2024</a:t>
             </a:fld>
             <a:endParaRPr lang="en-US"/>
           </a:p>
@@ -558,7 +558,7 @@
           <a:p>
             <a:fld id="{A6DF41ED-D6F1-4A66-8517-B46E4FBD4F30}" type="datetimeFigureOut">
               <a:rPr lang="en-US" smtClean="0"/>
-              <a:t>7/26/2024</a:t>
+              <a:t>7/28/2024</a:t>
             </a:fld>
             <a:endParaRPr lang="en-US"/>
           </a:p>
@@ -814,7 +814,7 @@
           <a:p>
             <a:fld id="{A6DF41ED-D6F1-4A66-8517-B46E4FBD4F30}" type="datetimeFigureOut">
               <a:rPr lang="en-US" smtClean="0"/>
-              <a:t>7/26/2024</a:t>
+              <a:t>7/28/2024</a:t>
             </a:fld>
             <a:endParaRPr lang="en-US"/>
           </a:p>
@@ -988,7 +988,7 @@
           <a:p>
             <a:fld id="{A6DF41ED-D6F1-4A66-8517-B46E4FBD4F30}" type="datetimeFigureOut">
               <a:rPr lang="en-US" smtClean="0"/>
-              <a:t>7/26/2024</a:t>
+              <a:t>7/28/2024</a:t>
             </a:fld>
             <a:endParaRPr lang="en-US"/>
           </a:p>
@@ -1331,7 +1331,7 @@
           <a:p>
             <a:fld id="{A6DF41ED-D6F1-4A66-8517-B46E4FBD4F30}" type="datetimeFigureOut">
               <a:rPr lang="en-US" smtClean="0"/>
-              <a:t>7/26/2024</a:t>
+              <a:t>7/28/2024</a:t>
             </a:fld>
             <a:endParaRPr lang="en-US"/>
           </a:p>
@@ -1606,7 +1606,7 @@
           <a:p>
             <a:fld id="{A6DF41ED-D6F1-4A66-8517-B46E4FBD4F30}" type="datetimeFigureOut">
               <a:rPr lang="en-US" smtClean="0"/>
-              <a:t>7/26/2024</a:t>
+              <a:t>7/28/2024</a:t>
             </a:fld>
             <a:endParaRPr lang="en-US"/>
           </a:p>
@@ -1985,7 +1985,7 @@
           <a:p>
             <a:fld id="{A6DF41ED-D6F1-4A66-8517-B46E4FBD4F30}" type="datetimeFigureOut">
               <a:rPr lang="en-US" smtClean="0"/>
-              <a:t>7/26/2024</a:t>
+              <a:t>7/28/2024</a:t>
             </a:fld>
             <a:endParaRPr lang="en-US"/>
           </a:p>
@@ -2103,7 +2103,7 @@
           <a:p>
             <a:fld id="{A6DF41ED-D6F1-4A66-8517-B46E4FBD4F30}" type="datetimeFigureOut">
               <a:rPr lang="en-US" smtClean="0"/>
-              <a:t>7/26/2024</a:t>
+              <a:t>7/28/2024</a:t>
             </a:fld>
             <a:endParaRPr lang="en-US"/>
           </a:p>
@@ -2274,7 +2274,7 @@
           <a:p>
             <a:fld id="{A6DF41ED-D6F1-4A66-8517-B46E4FBD4F30}" type="datetimeFigureOut">
               <a:rPr lang="en-US" smtClean="0"/>
-              <a:t>7/26/2024</a:t>
+              <a:t>7/28/2024</a:t>
             </a:fld>
             <a:endParaRPr lang="en-US"/>
           </a:p>
@@ -2628,7 +2628,7 @@
           <a:p>
             <a:fld id="{A6DF41ED-D6F1-4A66-8517-B46E4FBD4F30}" type="datetimeFigureOut">
               <a:rPr lang="en-US" smtClean="0"/>
-              <a:t>7/26/2024</a:t>
+              <a:t>7/28/2024</a:t>
             </a:fld>
             <a:endParaRPr lang="en-US"/>
           </a:p>
@@ -3010,7 +3010,7 @@
           <a:p>
             <a:fld id="{A6DF41ED-D6F1-4A66-8517-B46E4FBD4F30}" type="datetimeFigureOut">
               <a:rPr lang="en-US" smtClean="0"/>
-              <a:t>7/26/2024</a:t>
+              <a:t>7/28/2024</a:t>
             </a:fld>
             <a:endParaRPr lang="en-US"/>
           </a:p>
@@ -3297,7 +3297,7 @@
           <a:p>
             <a:fld id="{A6DF41ED-D6F1-4A66-8517-B46E4FBD4F30}" type="datetimeFigureOut">
               <a:rPr lang="en-US" smtClean="0"/>
-              <a:t>7/26/2024</a:t>
+              <a:t>7/28/2024</a:t>
             </a:fld>
             <a:endParaRPr lang="en-US"/>
           </a:p>
@@ -4257,7 +4257,7 @@
             </a:pPr>
             <a:r>
               <a:rPr lang="en-US" dirty="0"/>
-              <a:t> Binary files are the most memory-efficient way to store arrays of information</a:t>
+              <a:t> Binary files are often the most memory-efficient way to store arrays of information</a:t>
             </a:r>
           </a:p>
           <a:p>
@@ -5103,7 +5103,7 @@
             </a:pPr>
             <a:r>
               <a:rPr lang="en-US" dirty="0"/>
-              <a:t>‘r’: read </a:t>
+              <a:t> ‘r’: read </a:t>
             </a:r>
           </a:p>
           <a:p>
@@ -5113,7 +5113,7 @@
             </a:pPr>
             <a:r>
               <a:rPr lang="en-US" dirty="0"/>
-              <a:t>‘a’: append</a:t>
+              <a:t> ‘a’: append</a:t>
             </a:r>
           </a:p>
           <a:p>
@@ -5442,7 +5442,7 @@
           <a:p>
             <a:r>
               <a:rPr lang="en-US" dirty="0"/>
-              <a:t>Plain text files – with statement</a:t>
+              <a:t>Plain text files – context manager</a:t>
             </a:r>
           </a:p>
         </p:txBody>
@@ -5469,7 +5469,7 @@
         </p:blipFill>
         <p:spPr>
           <a:xfrm>
-            <a:off x="1677335" y="2876801"/>
+            <a:off x="1677335" y="3097865"/>
             <a:ext cx="8837330" cy="767405"/>
           </a:xfrm>
           <a:prstGeom prst="rect">
@@ -5499,7 +5499,7 @@
         </p:blipFill>
         <p:spPr>
           <a:xfrm>
-            <a:off x="1707815" y="4590017"/>
+            <a:off x="1707815" y="3911754"/>
             <a:ext cx="8837330" cy="579397"/>
           </a:xfrm>
           <a:prstGeom prst="rect">
@@ -5539,15 +5539,15 @@
             </a:pPr>
             <a:r>
               <a:rPr lang="en-US" dirty="0"/>
-              <a:t> The with statement defines the variable </a:t>
+              <a:t> The </a:t>
             </a:r>
             <a:r>
               <a:rPr lang="en-US" i="1" dirty="0"/>
-              <a:t>file</a:t>
+              <a:t>with</a:t>
             </a:r>
             <a:r>
               <a:rPr lang="en-US" dirty="0"/>
-              <a:t> only within the indented portion</a:t>
+              <a:t> statement opens the file only within the indented portion</a:t>
             </a:r>
           </a:p>
           <a:p>
@@ -5557,7 +5557,107 @@
             </a:pPr>
             <a:r>
               <a:rPr lang="en-US" dirty="0"/>
-              <a:t> This is important for error handling</a:t>
+              <a:t> This ensures that the file is closed properly if an error occurs</a:t>
+            </a:r>
+          </a:p>
+        </p:txBody>
+      </p:sp>
+      <p:pic>
+        <p:nvPicPr>
+          <p:cNvPr id="5" name="Picture 4">
+            <a:extLst>
+              <a:ext uri="{FF2B5EF4-FFF2-40B4-BE49-F238E27FC236}">
+                <a16:creationId xmlns:a16="http://schemas.microsoft.com/office/drawing/2014/main" id="{1679BA5B-4D23-26DE-CF53-92D504ECEE6C}"/>
+              </a:ext>
+            </a:extLst>
+          </p:cNvPr>
+          <p:cNvPicPr>
+            <a:picLocks noChangeAspect="1"/>
+          </p:cNvPicPr>
+          <p:nvPr/>
+        </p:nvPicPr>
+        <p:blipFill>
+          <a:blip r:embed="rId4"/>
+          <a:stretch>
+            <a:fillRect/>
+          </a:stretch>
+        </p:blipFill>
+        <p:spPr>
+          <a:xfrm>
+            <a:off x="1677335" y="5097377"/>
+            <a:ext cx="8837330" cy="880091"/>
+          </a:xfrm>
+          <a:prstGeom prst="rect">
+            <a:avLst/>
+          </a:prstGeom>
+        </p:spPr>
+      </p:pic>
+      <p:sp>
+        <p:nvSpPr>
+          <p:cNvPr id="6" name="TextBox 5">
+            <a:extLst>
+              <a:ext uri="{FF2B5EF4-FFF2-40B4-BE49-F238E27FC236}">
+                <a16:creationId xmlns:a16="http://schemas.microsoft.com/office/drawing/2014/main" id="{F8872285-5B10-DC06-9976-53EECEC63D70}"/>
+              </a:ext>
+            </a:extLst>
+          </p:cNvPr>
+          <p:cNvSpPr txBox="1"/>
+          <p:nvPr/>
+        </p:nvSpPr>
+        <p:spPr>
+          <a:xfrm>
+            <a:off x="4958862" y="2823811"/>
+            <a:ext cx="2642716" cy="523220"/>
+          </a:xfrm>
+          <a:prstGeom prst="rect">
+            <a:avLst/>
+          </a:prstGeom>
+          <a:noFill/>
+        </p:spPr>
+        <p:txBody>
+          <a:bodyPr wrap="square" rtlCol="0">
+            <a:spAutoFit/>
+          </a:bodyPr>
+          <a:lstStyle/>
+          <a:p>
+            <a:r>
+              <a:rPr lang="en-US" sz="2800" dirty="0"/>
+              <a:t>Don’t do this</a:t>
+            </a:r>
+          </a:p>
+        </p:txBody>
+      </p:sp>
+      <p:sp>
+        <p:nvSpPr>
+          <p:cNvPr id="9" name="TextBox 8">
+            <a:extLst>
+              <a:ext uri="{FF2B5EF4-FFF2-40B4-BE49-F238E27FC236}">
+                <a16:creationId xmlns:a16="http://schemas.microsoft.com/office/drawing/2014/main" id="{0A5E8A8D-7133-5110-3F6D-537C52AFBACA}"/>
+              </a:ext>
+            </a:extLst>
+          </p:cNvPr>
+          <p:cNvSpPr txBox="1"/>
+          <p:nvPr/>
+        </p:nvSpPr>
+        <p:spPr>
+          <a:xfrm>
+            <a:off x="4805122" y="4493265"/>
+            <a:ext cx="2642716" cy="523220"/>
+          </a:xfrm>
+          <a:prstGeom prst="rect">
+            <a:avLst/>
+          </a:prstGeom>
+          <a:noFill/>
+        </p:spPr>
+        <p:txBody>
+          <a:bodyPr wrap="square" rtlCol="0">
+            <a:spAutoFit/>
+          </a:bodyPr>
+          <a:lstStyle/>
+          <a:p>
+            <a:r>
+              <a:rPr lang="en-US" sz="2800" dirty="0"/>
+              <a:t>Do this instead</a:t>
             </a:r>
           </a:p>
         </p:txBody>
@@ -6093,7 +6193,7 @@
             </a:lvl9pPr>
           </a:lstStyle>
           <a:p>
-            <a:pPr marL="0" indent="0" algn="ctr">
+            <a:pPr marL="0" indent="0">
               <a:buFont typeface="Calibri" panose="020F0502020204030204" pitchFamily="34" charset="0"/>
               <a:buNone/>
             </a:pPr>
@@ -6104,7 +6204,7 @@
             <a:endParaRPr lang="en-US" dirty="0"/>
           </a:p>
           <a:p>
-            <a:pPr marL="0" indent="0" algn="ctr">
+            <a:pPr marL="0" indent="0">
               <a:buFont typeface="Calibri" panose="020F0502020204030204" pitchFamily="34" charset="0"/>
               <a:buNone/>
             </a:pPr>
@@ -6114,7 +6214,7 @@
             </a:r>
           </a:p>
           <a:p>
-            <a:pPr marL="0" indent="0" algn="ctr">
+            <a:pPr marL="0" indent="0">
               <a:buFont typeface="Calibri" panose="020F0502020204030204" pitchFamily="34" charset="0"/>
               <a:buNone/>
             </a:pPr>
@@ -6124,7 +6224,7 @@
             </a:r>
           </a:p>
           <a:p>
-            <a:pPr marL="0" indent="0" algn="ctr">
+            <a:pPr marL="0" indent="0">
               <a:buFont typeface="Calibri" panose="020F0502020204030204" pitchFamily="34" charset="0"/>
               <a:buNone/>
             </a:pPr>
@@ -6134,7 +6234,7 @@
             </a:r>
           </a:p>
           <a:p>
-            <a:pPr marL="0" indent="0" algn="ctr">
+            <a:pPr marL="0" indent="0">
               <a:buFont typeface="Calibri" panose="020F0502020204030204" pitchFamily="34" charset="0"/>
               <a:buNone/>
             </a:pPr>
@@ -6144,7 +6244,7 @@
             </a:r>
           </a:p>
           <a:p>
-            <a:pPr marL="0" indent="0" algn="ctr">
+            <a:pPr marL="0" indent="0">
               <a:buFont typeface="Calibri" panose="020F0502020204030204" pitchFamily="34" charset="0"/>
               <a:buNone/>
             </a:pPr>

</xml_diff>

<commit_message>
Cleaned up IC/DAQ oscope
</commit_message>
<xml_diff>
--- a/lessons/instrument_control/lesson7/file_io.pptx
+++ b/lessons/instrument_control/lesson7/file_io.pptx
@@ -3846,7 +3846,7 @@
           <a:p>
             <a:r>
               <a:rPr lang="en-US" sz="6000" dirty="0"/>
-              <a:t>File I/O</a:t>
+              <a:t>Python File I/O</a:t>
             </a:r>
           </a:p>
         </p:txBody>
@@ -3874,7 +3874,15 @@
           <a:p>
             <a:r>
               <a:rPr lang="en-US" dirty="0"/>
-              <a:t>Lesson 7</a:t>
+              <a:t>IC</a:t>
+            </a:r>
+            <a:r>
+              <a:rPr lang="en-US"/>
+              <a:t>/DAQ Lesson </a:t>
+            </a:r>
+            <a:r>
+              <a:rPr lang="en-US" dirty="0"/>
+              <a:t>7</a:t>
             </a:r>
           </a:p>
           <a:p>

</xml_diff>